<commit_message>
Add example moderator characterisation from SNS
</commit_message>
<xml_diff>
--- a/CSNS_March_2019/5_Friday_March_29th/2_modify_component/Modify_a_component.pptx
+++ b/CSNS_March_2019/5_Friday_March_29th/2_modify_component/Modify_a_component.pptx
@@ -16629,14 +16629,19 @@
             <a:r>
               <a:t>Fit 1-3 Maxwellians using iFit - use these with one of the proposed modified components</a:t>
             </a:r>
-          </a:p>
-          <a:p>
-            <a:pPr/>
+            <a:br/>
+            <a:br/>
+            <a:br/>
+            <a:br/>
           </a:p>
           <a:p>
             <a:pPr/>
             <a:r>
-              <a:t>A “proper” solution for the future would be neutronics calculations for the different CSNS moderators, and characterise/fit these using Ikeda-Carpenter functions for the different time-steps, followed by “stitching” these using e.g. Padé functions in the time-domain. See attached report from SNS for examples.</a:t>
+              <a:t>A “proper” solution for the future would be neutronics calculations for the different CSNS moderators, and characterise/fit these using Ikeda-Carpenter functions for the different time-steps, followed by “stitching” these using e.g. Padé functions in the time-domain. See attached report from SNS second target station for examples </a:t>
+            </a:r>
+            <a:br/>
+            <a:r>
+              <a:t>- file: SNS-STS-moderator-files.zip</a:t>
             </a:r>
           </a:p>
         </p:txBody>

</xml_diff>